<commit_message>
finish the first draft of NTOU presentation
</commit_message>
<xml_diff>
--- a/Presentation/HypoFigs.pptx
+++ b/Presentation/HypoFigs.pptx
@@ -11,9 +11,9 @@
     <p:sldId id="257" r:id="rId2"/>
     <p:sldId id="561" r:id="rId3"/>
     <p:sldId id="558" r:id="rId4"/>
-    <p:sldId id="560" r:id="rId5"/>
-    <p:sldId id="559" r:id="rId6"/>
-    <p:sldId id="260" r:id="rId7"/>
+    <p:sldId id="564" r:id="rId5"/>
+    <p:sldId id="562" r:id="rId6"/>
+    <p:sldId id="563" r:id="rId7"/>
     <p:sldId id="259" r:id="rId8"/>
     <p:sldId id="261" r:id="rId9"/>
     <p:sldId id="262" r:id="rId10"/>
@@ -1041,7 +1041,7 @@
         </p:nvSpPr>
         <p:spPr>
           <a:xfrm>
-            <a:off x="1440061" y="3214322"/>
+            <a:off x="1440061" y="3214324"/>
             <a:ext cx="8640366" cy="1477538"/>
           </a:xfrm>
         </p:spPr>
@@ -1371,7 +1371,7 @@
         </p:nvSpPr>
         <p:spPr>
           <a:xfrm>
-            <a:off x="8244353" y="325827"/>
+            <a:off x="8244357" y="325829"/>
             <a:ext cx="2484105" cy="5186258"/>
           </a:xfrm>
         </p:spPr>
@@ -1399,7 +1399,7 @@
         </p:nvSpPr>
         <p:spPr>
           <a:xfrm>
-            <a:off x="792033" y="325827"/>
+            <a:off x="792033" y="325829"/>
             <a:ext cx="7308310" cy="5186258"/>
           </a:xfrm>
         </p:spPr>
@@ -1721,7 +1721,7 @@
         </p:nvSpPr>
         <p:spPr>
           <a:xfrm>
-            <a:off x="786037" y="1525705"/>
+            <a:off x="786041" y="1525707"/>
             <a:ext cx="9936421" cy="2545672"/>
           </a:xfrm>
         </p:spPr>
@@ -1753,7 +1753,7 @@
         </p:nvSpPr>
         <p:spPr>
           <a:xfrm>
-            <a:off x="786037" y="4095462"/>
+            <a:off x="786041" y="4095464"/>
             <a:ext cx="9936421" cy="1338709"/>
           </a:xfrm>
         </p:spPr>
@@ -1990,7 +1990,7 @@
         </p:nvSpPr>
         <p:spPr>
           <a:xfrm>
-            <a:off x="792034" y="1629117"/>
+            <a:off x="792034" y="1629119"/>
             <a:ext cx="4896207" cy="3882967"/>
           </a:xfrm>
         </p:spPr>
@@ -2047,7 +2047,7 @@
         </p:nvSpPr>
         <p:spPr>
           <a:xfrm>
-            <a:off x="5832251" y="1629117"/>
+            <a:off x="5832251" y="1629119"/>
             <a:ext cx="4896207" cy="3882967"/>
           </a:xfrm>
         </p:spPr>
@@ -2199,7 +2199,7 @@
         </p:nvSpPr>
         <p:spPr>
           <a:xfrm>
-            <a:off x="793538" y="325826"/>
+            <a:off x="793540" y="325829"/>
             <a:ext cx="9936421" cy="1182881"/>
           </a:xfrm>
         </p:spPr>
@@ -2292,7 +2292,7 @@
         </p:nvSpPr>
         <p:spPr>
           <a:xfrm>
-            <a:off x="793535" y="2235435"/>
+            <a:off x="793535" y="2235437"/>
             <a:ext cx="4873706" cy="3287983"/>
           </a:xfrm>
         </p:spPr>
@@ -2414,7 +2414,7 @@
         </p:nvSpPr>
         <p:spPr>
           <a:xfrm>
-            <a:off x="5832247" y="2235435"/>
+            <a:off x="5832247" y="2235437"/>
             <a:ext cx="4897708" cy="3287983"/>
           </a:xfrm>
         </p:spPr>
@@ -2779,7 +2779,7 @@
         </p:nvSpPr>
         <p:spPr>
           <a:xfrm>
-            <a:off x="793539" y="407988"/>
+            <a:off x="793543" y="407988"/>
             <a:ext cx="3715657" cy="1427956"/>
           </a:xfrm>
         </p:spPr>
@@ -2811,7 +2811,7 @@
         </p:nvSpPr>
         <p:spPr>
           <a:xfrm>
-            <a:off x="4897712" y="881142"/>
+            <a:off x="4897716" y="881142"/>
             <a:ext cx="5832247" cy="4349034"/>
           </a:xfrm>
         </p:spPr>
@@ -2896,7 +2896,7 @@
         </p:nvSpPr>
         <p:spPr>
           <a:xfrm>
-            <a:off x="793539" y="1835947"/>
+            <a:off x="793543" y="1835949"/>
             <a:ext cx="3715657" cy="3401313"/>
           </a:xfrm>
         </p:spPr>
@@ -3056,7 +3056,7 @@
         </p:nvSpPr>
         <p:spPr>
           <a:xfrm>
-            <a:off x="793539" y="407988"/>
+            <a:off x="793543" y="407988"/>
             <a:ext cx="3715657" cy="1427956"/>
           </a:xfrm>
         </p:spPr>
@@ -3088,7 +3088,7 @@
         </p:nvSpPr>
         <p:spPr>
           <a:xfrm>
-            <a:off x="4897712" y="881142"/>
+            <a:off x="4897716" y="881142"/>
             <a:ext cx="5832247" cy="4349034"/>
           </a:xfrm>
         </p:spPr>
@@ -3153,7 +3153,7 @@
         </p:nvSpPr>
         <p:spPr>
           <a:xfrm>
-            <a:off x="793539" y="1835947"/>
+            <a:off x="793543" y="1835949"/>
             <a:ext cx="3715657" cy="3401313"/>
           </a:xfrm>
         </p:spPr>
@@ -3318,7 +3318,7 @@
         </p:nvSpPr>
         <p:spPr>
           <a:xfrm>
-            <a:off x="792037" y="325826"/>
+            <a:off x="792037" y="325829"/>
             <a:ext cx="9936421" cy="1182881"/>
           </a:xfrm>
           <a:prstGeom prst="rect">
@@ -3351,7 +3351,7 @@
         </p:nvSpPr>
         <p:spPr>
           <a:xfrm>
-            <a:off x="792037" y="1629117"/>
+            <a:off x="792037" y="1629119"/>
             <a:ext cx="9936421" cy="3882967"/>
           </a:xfrm>
           <a:prstGeom prst="rect">
@@ -4081,7 +4081,7 @@
         </p:nvCxnSpPr>
         <p:spPr>
           <a:xfrm flipV="1">
-            <a:off x="1651445" y="1385833"/>
+            <a:off x="1651449" y="1385833"/>
             <a:ext cx="4108801" cy="561526"/>
           </a:xfrm>
           <a:prstGeom prst="straightConnector1">
@@ -4127,7 +4127,7 @@
         </p:nvCxnSpPr>
         <p:spPr>
           <a:xfrm flipH="1" flipV="1">
-            <a:off x="5760246" y="1385833"/>
+            <a:off x="5760250" y="1385833"/>
             <a:ext cx="4120799" cy="580004"/>
           </a:xfrm>
           <a:prstGeom prst="straightConnector1">
@@ -4312,7 +4312,7 @@
         </p:nvCxnSpPr>
         <p:spPr>
           <a:xfrm flipV="1">
-            <a:off x="4248244" y="2286004"/>
+            <a:off x="4248244" y="2286010"/>
             <a:ext cx="3024000" cy="449"/>
           </a:xfrm>
           <a:prstGeom prst="straightConnector1">
@@ -4423,7 +4423,7 @@
         </p:nvCxnSpPr>
         <p:spPr>
           <a:xfrm>
-            <a:off x="2718244" y="2646453"/>
+            <a:off x="2718244" y="2646459"/>
             <a:ext cx="1080000" cy="719551"/>
           </a:xfrm>
           <a:prstGeom prst="straightConnector1">
@@ -4639,7 +4639,7 @@
         </p:nvCxnSpPr>
         <p:spPr>
           <a:xfrm flipH="1" flipV="1">
-            <a:off x="4248244" y="2286453"/>
+            <a:off x="4248244" y="2286459"/>
             <a:ext cx="1944000" cy="1529551"/>
           </a:xfrm>
           <a:prstGeom prst="straightConnector1">
@@ -4676,8 +4676,8 @@
         </p:nvSpPr>
         <p:spPr>
           <a:xfrm>
-            <a:off x="5444051" y="1944377"/>
-            <a:ext cx="516488" cy="317459"/>
+            <a:off x="5444054" y="1944381"/>
+            <a:ext cx="516487" cy="317459"/>
           </a:xfrm>
           <a:prstGeom prst="rect">
             <a:avLst/>
@@ -5064,7 +5064,7 @@
         </p:nvCxnSpPr>
         <p:spPr>
           <a:xfrm flipH="1" flipV="1">
-            <a:off x="8802244" y="2646004"/>
+            <a:off x="8802244" y="2646010"/>
             <a:ext cx="1745756" cy="2358071"/>
           </a:xfrm>
           <a:prstGeom prst="straightConnector1">
@@ -5111,7 +5111,7 @@
         </p:nvCxnSpPr>
         <p:spPr>
           <a:xfrm flipH="1" flipV="1">
-            <a:off x="7722244" y="4266004"/>
+            <a:off x="7722244" y="4266010"/>
             <a:ext cx="917756" cy="738071"/>
           </a:xfrm>
           <a:prstGeom prst="straightConnector1">
@@ -5264,7 +5264,7 @@
         </p:nvSpPr>
         <p:spPr>
           <a:xfrm>
-            <a:off x="8646854" y="1233996"/>
+            <a:off x="8646860" y="1233996"/>
             <a:ext cx="2514805" cy="3773010"/>
           </a:xfrm>
           <a:custGeom>
@@ -5349,7 +5349,7 @@
         </p:nvSpPr>
         <p:spPr>
           <a:xfrm>
-            <a:off x="6729278" y="1233996"/>
+            <a:off x="6729284" y="1233996"/>
             <a:ext cx="4734199" cy="3773010"/>
           </a:xfrm>
           <a:custGeom>
@@ -5531,7 +5531,7 @@
         </p:nvCxnSpPr>
         <p:spPr>
           <a:xfrm flipH="1" flipV="1">
-            <a:off x="1638244" y="1206414"/>
+            <a:off x="1638244" y="1206418"/>
             <a:ext cx="1080000" cy="720035"/>
           </a:xfrm>
           <a:prstGeom prst="straightConnector1">
@@ -5654,7 +5654,7 @@
         </p:nvCxnSpPr>
         <p:spPr>
           <a:xfrm flipH="1">
-            <a:off x="2718244" y="1206000"/>
+            <a:off x="2718244" y="1206004"/>
             <a:ext cx="7074000" cy="720449"/>
           </a:xfrm>
           <a:prstGeom prst="straightConnector1">
@@ -5881,7 +5881,7 @@
         </p:nvCxnSpPr>
         <p:spPr>
           <a:xfrm flipV="1">
-            <a:off x="4248244" y="2286004"/>
+            <a:off x="4248244" y="2286010"/>
             <a:ext cx="3024000" cy="449"/>
           </a:xfrm>
           <a:prstGeom prst="straightConnector1">
@@ -5992,7 +5992,7 @@
         </p:nvCxnSpPr>
         <p:spPr>
           <a:xfrm>
-            <a:off x="2718244" y="2646453"/>
+            <a:off x="2718244" y="2646459"/>
             <a:ext cx="1080000" cy="719551"/>
           </a:xfrm>
           <a:prstGeom prst="straightConnector1">
@@ -6208,7 +6208,7 @@
         </p:nvCxnSpPr>
         <p:spPr>
           <a:xfrm flipH="1" flipV="1">
-            <a:off x="4248244" y="2286453"/>
+            <a:off x="4248244" y="2286459"/>
             <a:ext cx="1944000" cy="1529551"/>
           </a:xfrm>
           <a:prstGeom prst="straightConnector1">
@@ -6245,7 +6245,7 @@
         </p:nvSpPr>
         <p:spPr>
           <a:xfrm>
-            <a:off x="5016851" y="1944377"/>
+            <a:off x="5016851" y="1944381"/>
             <a:ext cx="1370888" cy="317459"/>
           </a:xfrm>
           <a:prstGeom prst="rect">
@@ -6424,7 +6424,7 @@
         </p:nvCxnSpPr>
         <p:spPr>
           <a:xfrm flipV="1">
-            <a:off x="4248244" y="2286004"/>
+            <a:off x="4248244" y="2286010"/>
             <a:ext cx="3024000" cy="449"/>
           </a:xfrm>
           <a:prstGeom prst="straightConnector1">
@@ -6535,7 +6535,7 @@
         </p:nvCxnSpPr>
         <p:spPr>
           <a:xfrm>
-            <a:off x="2718244" y="2646453"/>
+            <a:off x="2718244" y="2646459"/>
             <a:ext cx="1080000" cy="719551"/>
           </a:xfrm>
           <a:prstGeom prst="straightConnector1">
@@ -6751,7 +6751,7 @@
         </p:nvCxnSpPr>
         <p:spPr>
           <a:xfrm flipH="1" flipV="1">
-            <a:off x="4248244" y="2286453"/>
+            <a:off x="4248244" y="2286459"/>
             <a:ext cx="1944000" cy="1529551"/>
           </a:xfrm>
           <a:prstGeom prst="straightConnector1">
@@ -6788,7 +6788,7 @@
         </p:nvSpPr>
         <p:spPr>
           <a:xfrm>
-            <a:off x="5016851" y="1944377"/>
+            <a:off x="5016851" y="1944381"/>
             <a:ext cx="1370888" cy="317459"/>
           </a:xfrm>
           <a:prstGeom prst="rect">
@@ -6938,7 +6938,7 @@
         </p:nvCxnSpPr>
         <p:spPr>
           <a:xfrm flipH="1" flipV="1">
-            <a:off x="1638244" y="1206414"/>
+            <a:off x="1638244" y="1206418"/>
             <a:ext cx="1080000" cy="720035"/>
           </a:xfrm>
           <a:prstGeom prst="straightConnector1">
@@ -7061,7 +7061,7 @@
         </p:nvCxnSpPr>
         <p:spPr>
           <a:xfrm flipH="1">
-            <a:off x="2718244" y="1206000"/>
+            <a:off x="2718244" y="1206004"/>
             <a:ext cx="7074000" cy="720449"/>
           </a:xfrm>
           <a:prstGeom prst="straightConnector1">
@@ -7288,7 +7288,7 @@
         </p:nvCxnSpPr>
         <p:spPr>
           <a:xfrm flipV="1">
-            <a:off x="4248244" y="2286004"/>
+            <a:off x="4248244" y="2286010"/>
             <a:ext cx="3024000" cy="449"/>
           </a:xfrm>
           <a:prstGeom prst="straightConnector1">
@@ -7399,7 +7399,7 @@
         </p:nvCxnSpPr>
         <p:spPr>
           <a:xfrm>
-            <a:off x="2718244" y="2646453"/>
+            <a:off x="2718244" y="2646459"/>
             <a:ext cx="1080000" cy="719551"/>
           </a:xfrm>
           <a:prstGeom prst="straightConnector1">
@@ -7615,7 +7615,7 @@
         </p:nvCxnSpPr>
         <p:spPr>
           <a:xfrm flipH="1" flipV="1">
-            <a:off x="4248244" y="2286453"/>
+            <a:off x="4248244" y="2286459"/>
             <a:ext cx="1944000" cy="1529551"/>
           </a:xfrm>
           <a:prstGeom prst="straightConnector1">
@@ -7652,8 +7652,8 @@
         </p:nvSpPr>
         <p:spPr>
           <a:xfrm>
-            <a:off x="5444051" y="1944377"/>
-            <a:ext cx="516488" cy="317459"/>
+            <a:off x="5444054" y="1944381"/>
+            <a:ext cx="516487" cy="317459"/>
           </a:xfrm>
           <a:prstGeom prst="rect">
             <a:avLst/>
@@ -8040,7 +8040,7 @@
         </p:nvCxnSpPr>
         <p:spPr>
           <a:xfrm flipH="1" flipV="1">
-            <a:off x="8802244" y="2646004"/>
+            <a:off x="8802244" y="2646010"/>
             <a:ext cx="1745756" cy="2358071"/>
           </a:xfrm>
           <a:prstGeom prst="straightConnector1">
@@ -8087,7 +8087,7 @@
         </p:nvCxnSpPr>
         <p:spPr>
           <a:xfrm flipH="1" flipV="1">
-            <a:off x="7722244" y="4266004"/>
+            <a:off x="7722244" y="4266010"/>
             <a:ext cx="917756" cy="738071"/>
           </a:xfrm>
           <a:prstGeom prst="straightConnector1">
@@ -8240,7 +8240,7 @@
         </p:nvSpPr>
         <p:spPr>
           <a:xfrm>
-            <a:off x="8646854" y="1233996"/>
+            <a:off x="8646860" y="1233996"/>
             <a:ext cx="2514805" cy="3773010"/>
           </a:xfrm>
           <a:custGeom>
@@ -8325,7 +8325,7 @@
         </p:nvSpPr>
         <p:spPr>
           <a:xfrm>
-            <a:off x="6729278" y="1233996"/>
+            <a:off x="6729284" y="1233996"/>
             <a:ext cx="4734199" cy="3773010"/>
           </a:xfrm>
           <a:custGeom>
@@ -8507,7 +8507,7 @@
         </p:nvCxnSpPr>
         <p:spPr>
           <a:xfrm flipH="1" flipV="1">
-            <a:off x="1638244" y="1206414"/>
+            <a:off x="1638244" y="1206418"/>
             <a:ext cx="1080000" cy="720035"/>
           </a:xfrm>
           <a:prstGeom prst="straightConnector1">
@@ -8630,7 +8630,7 @@
         </p:nvCxnSpPr>
         <p:spPr>
           <a:xfrm flipH="1">
-            <a:off x="2718244" y="1206000"/>
+            <a:off x="2718244" y="1206004"/>
             <a:ext cx="7074000" cy="720449"/>
           </a:xfrm>
           <a:prstGeom prst="straightConnector1">
@@ -8884,7 +8884,7 @@
         </p:nvSpPr>
         <p:spPr>
           <a:xfrm>
-            <a:off x="4076538" y="5282592"/>
+            <a:off x="4076542" y="5282592"/>
             <a:ext cx="3626215" cy="531812"/>
           </a:xfrm>
           <a:prstGeom prst="rect">
@@ -9095,7 +9095,7 @@
         </p:nvGrpSpPr>
         <p:grpSpPr>
           <a:xfrm>
-            <a:off x="1764069" y="560300"/>
+            <a:off x="1764069" y="560304"/>
             <a:ext cx="7853756" cy="5111863"/>
             <a:chOff x="359219" y="1488443"/>
             <a:chExt cx="6661944" cy="4449614"/>
@@ -9768,7 +9768,7 @@
         </p:blipFill>
         <p:spPr>
           <a:xfrm>
-            <a:off x="2345256" y="-1"/>
+            <a:off x="2345262" y="-1"/>
             <a:ext cx="6829983" cy="6119813"/>
           </a:xfrm>
           <a:prstGeom prst="rect">
@@ -9828,7 +9828,7 @@
         </p:blipFill>
         <p:spPr>
           <a:xfrm>
-            <a:off x="0" y="1204212"/>
+            <a:off x="0" y="1204217"/>
             <a:ext cx="11520488" cy="3711391"/>
           </a:xfrm>
           <a:prstGeom prst="rect">
@@ -10131,7 +10131,7 @@
         </p:nvCxnSpPr>
         <p:spPr>
           <a:xfrm>
-            <a:off x="1651443" y="1009226"/>
+            <a:off x="1651447" y="1009226"/>
             <a:ext cx="1" cy="987600"/>
           </a:xfrm>
           <a:prstGeom prst="straightConnector1">
@@ -10263,7 +10263,7 @@
         </p:nvCxnSpPr>
         <p:spPr>
           <a:xfrm>
-            <a:off x="9881043" y="1042104"/>
+            <a:off x="9881043" y="1042108"/>
             <a:ext cx="0" cy="957827"/>
           </a:xfrm>
           <a:prstGeom prst="straightConnector1">
@@ -10309,7 +10309,7 @@
         </p:nvCxnSpPr>
         <p:spPr>
           <a:xfrm flipV="1">
-            <a:off x="3181444" y="584904"/>
+            <a:off x="3181446" y="584904"/>
             <a:ext cx="5169599" cy="1869122"/>
           </a:xfrm>
           <a:prstGeom prst="straightConnector1">
@@ -10355,7 +10355,7 @@
         </p:nvCxnSpPr>
         <p:spPr>
           <a:xfrm flipH="1" flipV="1">
-            <a:off x="3181443" y="559226"/>
+            <a:off x="3181443" y="559228"/>
             <a:ext cx="5169600" cy="1890705"/>
           </a:xfrm>
           <a:prstGeom prst="straightConnector1">
@@ -10399,7 +10399,7 @@
         </p:nvCxnSpPr>
         <p:spPr>
           <a:xfrm flipH="1" flipV="1">
-            <a:off x="1619504" y="3252030"/>
+            <a:off x="1619504" y="3252036"/>
             <a:ext cx="17412" cy="2246813"/>
           </a:xfrm>
           <a:prstGeom prst="straightConnector1">
@@ -10479,7 +10479,7 @@
         </p:nvCxnSpPr>
         <p:spPr>
           <a:xfrm flipV="1">
-            <a:off x="1907657" y="4052932"/>
+            <a:off x="1907663" y="4052932"/>
             <a:ext cx="3448595" cy="1132114"/>
           </a:xfrm>
           <a:prstGeom prst="line">
@@ -10514,8 +10514,8 @@
         </p:nvSpPr>
         <p:spPr>
           <a:xfrm>
-            <a:off x="2263707" y="5619560"/>
-            <a:ext cx="2389693" cy="369332"/>
+            <a:off x="2472066" y="5619561"/>
+            <a:ext cx="1972976" cy="317459"/>
           </a:xfrm>
           <a:prstGeom prst="rect">
             <a:avLst/>
@@ -10529,10 +10529,10 @@
           <a:p>
             <a:pPr algn="ctr"/>
             <a:r>
-              <a:rPr lang="en-US" altLang="zh-TW" sz="1800" dirty="0"/>
+              <a:rPr lang="en-US" altLang="zh-TW" dirty="0"/>
               <a:t>Bacteria (HNF) diversity</a:t>
             </a:r>
-            <a:endParaRPr lang="zh-TW" altLang="en-US" sz="1800" dirty="0"/>
+            <a:endParaRPr lang="zh-TW" altLang="en-US" dirty="0"/>
           </a:p>
         </p:txBody>
       </p:sp>
@@ -10544,8 +10544,8 @@
         </p:nvSpPr>
         <p:spPr>
           <a:xfrm rot="-5400000">
-            <a:off x="-466375" y="3913768"/>
-            <a:ext cx="2906950" cy="923330"/>
+            <a:off x="-207137" y="3991577"/>
+            <a:ext cx="2388474" cy="767711"/>
           </a:xfrm>
           <a:prstGeom prst="rect">
             <a:avLst/>
@@ -10559,24 +10559,24 @@
           <a:p>
             <a:pPr algn="ctr"/>
             <a:r>
-              <a:rPr lang="en-US" altLang="zh-TW" sz="1800" dirty="0"/>
+              <a:rPr lang="en-US" altLang="zh-TW" dirty="0"/>
               <a:t>Deterministic </a:t>
             </a:r>
           </a:p>
           <a:p>
             <a:pPr algn="ctr"/>
             <a:r>
-              <a:rPr lang="en-US" altLang="zh-TW" sz="1800" dirty="0"/>
+              <a:rPr lang="en-US" altLang="zh-TW" dirty="0"/>
               <a:t>assembly processes </a:t>
             </a:r>
           </a:p>
           <a:p>
             <a:pPr algn="ctr"/>
             <a:r>
-              <a:rPr lang="en-US" altLang="zh-TW" sz="1800" dirty="0"/>
+              <a:rPr lang="en-US" altLang="zh-TW" dirty="0"/>
               <a:t>of HNF (Bacteria) community</a:t>
             </a:r>
-            <a:endParaRPr lang="zh-TW" altLang="en-US" sz="1800" dirty="0"/>
+            <a:endParaRPr lang="zh-TW" altLang="en-US" dirty="0"/>
           </a:p>
         </p:txBody>
       </p:sp>
@@ -10596,7 +10596,7 @@
         </p:nvCxnSpPr>
         <p:spPr>
           <a:xfrm flipH="1" flipV="1">
-            <a:off x="6892544" y="3252029"/>
+            <a:off x="6892544" y="3252035"/>
             <a:ext cx="17412" cy="2246813"/>
           </a:xfrm>
           <a:prstGeom prst="straightConnector1">
@@ -10676,7 +10676,7 @@
         </p:nvCxnSpPr>
         <p:spPr>
           <a:xfrm flipV="1">
-            <a:off x="7180697" y="4052931"/>
+            <a:off x="7180703" y="4052931"/>
             <a:ext cx="3448595" cy="1132114"/>
           </a:xfrm>
           <a:prstGeom prst="line">
@@ -10711,8 +10711,8 @@
         </p:nvSpPr>
         <p:spPr>
           <a:xfrm rot="-5400000">
-            <a:off x="5347035" y="4190765"/>
-            <a:ext cx="2389693" cy="369332"/>
+            <a:off x="5555396" y="4216704"/>
+            <a:ext cx="1972976" cy="317459"/>
           </a:xfrm>
           <a:prstGeom prst="rect">
             <a:avLst/>
@@ -10726,10 +10726,10 @@
           <a:p>
             <a:pPr algn="ctr"/>
             <a:r>
-              <a:rPr lang="en-US" altLang="zh-TW" sz="1800" dirty="0"/>
+              <a:rPr lang="en-US" altLang="zh-TW" dirty="0"/>
               <a:t>HNF (Bacteria) diversity</a:t>
             </a:r>
-            <a:endParaRPr lang="zh-TW" altLang="en-US" sz="1800" dirty="0"/>
+            <a:endParaRPr lang="zh-TW" altLang="en-US" dirty="0"/>
           </a:p>
         </p:txBody>
       </p:sp>
@@ -10741,8 +10741,8 @@
         </p:nvSpPr>
         <p:spPr>
           <a:xfrm>
-            <a:off x="7213052" y="5511289"/>
-            <a:ext cx="3383875" cy="646331"/>
+            <a:off x="7516693" y="5511290"/>
+            <a:ext cx="2776594" cy="542584"/>
           </a:xfrm>
           <a:prstGeom prst="rect">
             <a:avLst/>
@@ -10756,17 +10756,17 @@
           <a:p>
             <a:pPr algn="ctr"/>
             <a:r>
-              <a:rPr lang="en-US" altLang="zh-TW" sz="1800" dirty="0"/>
+              <a:rPr lang="en-US" altLang="zh-TW" dirty="0"/>
               <a:t>Deterministic assembly processes </a:t>
             </a:r>
           </a:p>
           <a:p>
             <a:pPr algn="ctr"/>
             <a:r>
-              <a:rPr lang="en-US" altLang="zh-TW" sz="1800" dirty="0"/>
+              <a:rPr lang="en-US" altLang="zh-TW" dirty="0"/>
               <a:t>of HNF (Bacteria) community</a:t>
             </a:r>
-            <a:endParaRPr lang="zh-TW" altLang="en-US" sz="1800" dirty="0"/>
+            <a:endParaRPr lang="zh-TW" altLang="en-US" dirty="0"/>
           </a:p>
         </p:txBody>
       </p:sp>
@@ -10809,7 +10809,7 @@
         <p:spPr>
           <a:xfrm>
             <a:off x="121443" y="109226"/>
-            <a:ext cx="3060000" cy="720000"/>
+            <a:ext cx="3060000" cy="900000"/>
           </a:xfrm>
           <a:prstGeom prst="roundRect">
             <a:avLst/>
@@ -10843,14 +10843,33 @@
           <a:p>
             <a:pPr algn="ctr"/>
             <a:r>
-              <a:rPr lang="en-US" altLang="zh-TW" sz="1600" dirty="0">
+              <a:rPr lang="en-US" altLang="zh-TW" sz="2000" dirty="0">
                 <a:solidFill>
                   <a:schemeClr val="tx1"/>
                 </a:solidFill>
               </a:rPr>
-              <a:t>Bacteria diversity</a:t>
-            </a:r>
-            <a:endParaRPr lang="zh-TW" altLang="en-US" sz="1600" dirty="0">
+              <a:t>Bacteria </a:t>
+            </a:r>
+          </a:p>
+          <a:p>
+            <a:pPr algn="ctr"/>
+            <a:r>
+              <a:rPr lang="el-GR" altLang="zh-TW" sz="2000" b="1" dirty="0">
+                <a:solidFill>
+                  <a:schemeClr val="tx1"/>
+                </a:solidFill>
+              </a:rPr>
+              <a:t>β</a:t>
+            </a:r>
+            <a:r>
+              <a:rPr lang="en-US" altLang="zh-TW" sz="2000" b="1" dirty="0">
+                <a:solidFill>
+                  <a:schemeClr val="tx1"/>
+                </a:solidFill>
+              </a:rPr>
+              <a:t>-diversity</a:t>
+            </a:r>
+            <a:endParaRPr lang="zh-TW" altLang="en-US" sz="2000" b="1" dirty="0">
               <a:solidFill>
                 <a:schemeClr val="tx1"/>
               </a:solidFill>
@@ -10867,7 +10886,7 @@
         <p:spPr>
           <a:xfrm>
             <a:off x="8351043" y="127704"/>
-            <a:ext cx="3060000" cy="720000"/>
+            <a:ext cx="3060000" cy="914400"/>
           </a:xfrm>
           <a:prstGeom prst="roundRect">
             <a:avLst/>
@@ -10901,14 +10920,49 @@
           <a:p>
             <a:pPr algn="ctr"/>
             <a:r>
-              <a:rPr lang="en-US" altLang="zh-TW" sz="1600" dirty="0">
+              <a:rPr lang="en-US" altLang="zh-TW" sz="2000" dirty="0">
                 <a:solidFill>
                   <a:schemeClr val="tx1"/>
                 </a:solidFill>
               </a:rPr>
-              <a:t>HNF diversity</a:t>
-            </a:r>
-            <a:endParaRPr lang="zh-TW" altLang="en-US" sz="1600" dirty="0">
+              <a:t>Hetero-trophic </a:t>
+            </a:r>
+            <a:r>
+              <a:rPr lang="en-US" altLang="zh-TW" sz="2000" dirty="0" err="1">
+                <a:solidFill>
+                  <a:schemeClr val="tx1"/>
+                </a:solidFill>
+              </a:rPr>
+              <a:t>nano</a:t>
+            </a:r>
+            <a:r>
+              <a:rPr lang="en-US" altLang="zh-TW" sz="2000" dirty="0">
+                <a:solidFill>
+                  <a:schemeClr val="tx1"/>
+                </a:solidFill>
+              </a:rPr>
+              <a:t>-flagellate (HNF) </a:t>
+            </a:r>
+          </a:p>
+          <a:p>
+            <a:pPr algn="ctr"/>
+            <a:r>
+              <a:rPr lang="el-GR" altLang="zh-TW" sz="2000" b="1" dirty="0">
+                <a:solidFill>
+                  <a:schemeClr val="tx1"/>
+                </a:solidFill>
+              </a:rPr>
+              <a:t>β</a:t>
+            </a:r>
+            <a:r>
+              <a:rPr lang="en-US" altLang="zh-TW" sz="2000" b="1" dirty="0">
+                <a:solidFill>
+                  <a:schemeClr val="tx1"/>
+                </a:solidFill>
+              </a:rPr>
+              <a:t>-diversity</a:t>
+            </a:r>
+            <a:endParaRPr lang="zh-TW" altLang="en-US" sz="2000" b="1" dirty="0">
               <a:solidFill>
                 <a:schemeClr val="tx1"/>
               </a:solidFill>
@@ -10927,8 +10981,8 @@
         </p:nvCxnSpPr>
         <p:spPr>
           <a:xfrm>
-            <a:off x="3181443" y="469226"/>
-            <a:ext cx="5169600" cy="18478"/>
+            <a:off x="3181443" y="559226"/>
+            <a:ext cx="5169600" cy="25678"/>
           </a:xfrm>
           <a:prstGeom prst="straightConnector1">
             <a:avLst/>
@@ -10966,7 +11020,7 @@
         <p:spPr>
           <a:xfrm>
             <a:off x="121444" y="1996826"/>
-            <a:ext cx="3060000" cy="900000"/>
+            <a:ext cx="3060000" cy="914400"/>
           </a:xfrm>
           <a:prstGeom prst="roundRect">
             <a:avLst/>
@@ -11000,7 +11054,7 @@
           <a:p>
             <a:pPr algn="ctr"/>
             <a:r>
-              <a:rPr lang="en-US" altLang="zh-TW" sz="1600" dirty="0">
+              <a:rPr lang="en-US" altLang="zh-TW" sz="2000" dirty="0">
                 <a:solidFill>
                   <a:schemeClr val="tx1"/>
                 </a:solidFill>
@@ -11011,7 +11065,7 @@
           <a:p>
             <a:pPr algn="ctr"/>
             <a:r>
-              <a:rPr lang="en-US" altLang="zh-TW" sz="1600" dirty="0">
+              <a:rPr lang="en-US" altLang="zh-TW" sz="2000" dirty="0">
                 <a:solidFill>
                   <a:schemeClr val="tx1"/>
                 </a:solidFill>
@@ -11022,14 +11076,14 @@
           <a:p>
             <a:pPr algn="ctr"/>
             <a:r>
-              <a:rPr lang="en-US" altLang="zh-TW" sz="1600" b="1" dirty="0">
+              <a:rPr lang="en-US" altLang="zh-TW" sz="2000" b="1" dirty="0">
                 <a:solidFill>
                   <a:schemeClr val="tx1"/>
                 </a:solidFill>
               </a:rPr>
               <a:t>HNF community</a:t>
             </a:r>
-            <a:endParaRPr lang="zh-TW" altLang="en-US" sz="1600" b="1" dirty="0">
+            <a:endParaRPr lang="zh-TW" altLang="en-US" sz="2000" b="1" dirty="0">
               <a:solidFill>
                 <a:schemeClr val="tx1"/>
               </a:solidFill>
@@ -11049,8 +11103,8 @@
         </p:nvCxnSpPr>
         <p:spPr>
           <a:xfrm>
-            <a:off x="1651447" y="829226"/>
-            <a:ext cx="1" cy="1167600"/>
+            <a:off x="1651447" y="1009226"/>
+            <a:ext cx="1" cy="987600"/>
           </a:xfrm>
           <a:prstGeom prst="straightConnector1">
             <a:avLst/>
@@ -11126,7 +11180,7 @@
           <a:p>
             <a:pPr algn="ctr"/>
             <a:r>
-              <a:rPr lang="en-US" altLang="zh-TW" sz="1600" dirty="0">
+              <a:rPr lang="en-US" altLang="zh-TW" sz="2000" dirty="0">
                 <a:solidFill>
                   <a:schemeClr val="tx1"/>
                 </a:solidFill>
@@ -11137,7 +11191,7 @@
           <a:p>
             <a:pPr algn="ctr"/>
             <a:r>
-              <a:rPr lang="en-US" altLang="zh-TW" sz="1600" dirty="0">
+              <a:rPr lang="en-US" altLang="zh-TW" sz="2000" dirty="0">
                 <a:solidFill>
                   <a:schemeClr val="tx1"/>
                 </a:solidFill>
@@ -11148,14 +11202,14 @@
           <a:p>
             <a:pPr algn="ctr"/>
             <a:r>
-              <a:rPr lang="en-US" altLang="zh-TW" sz="1600" b="1" dirty="0">
+              <a:rPr lang="en-US" altLang="zh-TW" sz="2000" b="1" dirty="0">
                 <a:solidFill>
                   <a:schemeClr val="tx1"/>
                 </a:solidFill>
               </a:rPr>
-              <a:t>Bacteria community</a:t>
-            </a:r>
-            <a:endParaRPr lang="zh-TW" altLang="en-US" sz="1600" b="1" dirty="0">
+              <a:t>bacteria community</a:t>
+            </a:r>
+            <a:endParaRPr lang="zh-TW" altLang="en-US" sz="2000" b="1" dirty="0">
               <a:solidFill>
                 <a:schemeClr val="tx1"/>
               </a:solidFill>
@@ -11181,8 +11235,8 @@
         </p:nvCxnSpPr>
         <p:spPr>
           <a:xfrm>
-            <a:off x="9881043" y="847708"/>
-            <a:ext cx="0" cy="1152227"/>
+            <a:off x="9881043" y="1042108"/>
+            <a:ext cx="0" cy="957827"/>
           </a:xfrm>
           <a:prstGeom prst="straightConnector1">
             <a:avLst/>
@@ -11227,8 +11281,8 @@
         </p:nvCxnSpPr>
         <p:spPr>
           <a:xfrm flipV="1">
-            <a:off x="3181449" y="487704"/>
-            <a:ext cx="5169599" cy="1959122"/>
+            <a:off x="3181446" y="584904"/>
+            <a:ext cx="5169599" cy="1869122"/>
           </a:xfrm>
           <a:prstGeom prst="straightConnector1">
             <a:avLst/>
@@ -11273,8 +11327,8 @@
         </p:nvCxnSpPr>
         <p:spPr>
           <a:xfrm flipH="1" flipV="1">
-            <a:off x="3181443" y="469231"/>
-            <a:ext cx="5169600" cy="1980705"/>
+            <a:off x="3181443" y="559228"/>
+            <a:ext cx="5169600" cy="1890705"/>
           </a:xfrm>
           <a:prstGeom prst="straightConnector1">
             <a:avLst/>
@@ -11317,7 +11371,7 @@
         </p:nvCxnSpPr>
         <p:spPr>
           <a:xfrm flipH="1" flipV="1">
-            <a:off x="1470210" y="3196048"/>
+            <a:off x="1619504" y="3252036"/>
             <a:ext cx="17412" cy="2246813"/>
           </a:xfrm>
           <a:prstGeom prst="straightConnector1">
@@ -11361,7 +11415,7 @@
         </p:nvCxnSpPr>
         <p:spPr>
           <a:xfrm>
-            <a:off x="1470210" y="5434147"/>
+            <a:off x="1619504" y="5490129"/>
             <a:ext cx="4007482" cy="0"/>
           </a:xfrm>
           <a:prstGeom prst="straightConnector1">
@@ -11397,7 +11451,7 @@
         </p:nvCxnSpPr>
         <p:spPr>
           <a:xfrm flipV="1">
-            <a:off x="1758363" y="3996950"/>
+            <a:off x="1907663" y="4052932"/>
             <a:ext cx="3448595" cy="1132114"/>
           </a:xfrm>
           <a:prstGeom prst="line">
@@ -11432,7 +11486,7 @@
         </p:nvSpPr>
         <p:spPr>
           <a:xfrm>
-            <a:off x="2322771" y="5563578"/>
+            <a:off x="2472066" y="5619561"/>
             <a:ext cx="1972976" cy="317459"/>
           </a:xfrm>
           <a:prstGeom prst="rect">
@@ -11462,8 +11516,8 @@
         </p:nvSpPr>
         <p:spPr>
           <a:xfrm rot="-5400000">
-            <a:off x="-307890" y="4048158"/>
-            <a:ext cx="2776593" cy="542584"/>
+            <a:off x="-207137" y="3991577"/>
+            <a:ext cx="2388474" cy="767711"/>
           </a:xfrm>
           <a:prstGeom prst="rect">
             <a:avLst/>
@@ -11478,7 +11532,14 @@
             <a:pPr algn="ctr"/>
             <a:r>
               <a:rPr lang="en-US" altLang="zh-TW" dirty="0"/>
-              <a:t>Deterministic assembly processes </a:t>
+              <a:t>Deterministic </a:t>
+            </a:r>
+          </a:p>
+          <a:p>
+            <a:pPr algn="ctr"/>
+            <a:r>
+              <a:rPr lang="en-US" altLang="zh-TW" dirty="0"/>
+              <a:t>assembly processes </a:t>
             </a:r>
           </a:p>
           <a:p>
@@ -11507,7 +11568,7 @@
         </p:nvCxnSpPr>
         <p:spPr>
           <a:xfrm flipH="1" flipV="1">
-            <a:off x="6743250" y="3196047"/>
+            <a:off x="6892544" y="3252035"/>
             <a:ext cx="17412" cy="2246813"/>
           </a:xfrm>
           <a:prstGeom prst="straightConnector1">
@@ -11551,7 +11612,7 @@
         </p:nvCxnSpPr>
         <p:spPr>
           <a:xfrm>
-            <a:off x="6743250" y="5434146"/>
+            <a:off x="6892544" y="5490128"/>
             <a:ext cx="4007482" cy="0"/>
           </a:xfrm>
           <a:prstGeom prst="straightConnector1">
@@ -11587,7 +11648,7 @@
         </p:nvCxnSpPr>
         <p:spPr>
           <a:xfrm flipV="1">
-            <a:off x="7031403" y="3996949"/>
+            <a:off x="7180703" y="4052931"/>
             <a:ext cx="3448595" cy="1132114"/>
           </a:xfrm>
           <a:prstGeom prst="line">
@@ -11622,8 +11683,8 @@
         </p:nvSpPr>
         <p:spPr>
           <a:xfrm rot="-5400000">
-            <a:off x="5385255" y="4160723"/>
-            <a:ext cx="2014654" cy="317459"/>
+            <a:off x="5555396" y="4216704"/>
+            <a:ext cx="1972976" cy="317459"/>
           </a:xfrm>
           <a:prstGeom prst="rect">
             <a:avLst/>
@@ -11652,8 +11713,8 @@
         </p:nvSpPr>
         <p:spPr>
           <a:xfrm>
-            <a:off x="7367399" y="5455307"/>
-            <a:ext cx="2776593" cy="542584"/>
+            <a:off x="7516693" y="5511290"/>
+            <a:ext cx="2776594" cy="542584"/>
           </a:xfrm>
           <a:prstGeom prst="rect">
             <a:avLst/>
@@ -11684,7 +11745,7 @@
     </p:spTree>
     <p:extLst>
       <p:ext uri="{BB962C8B-B14F-4D97-AF65-F5344CB8AC3E}">
-        <p14:creationId xmlns:p14="http://schemas.microsoft.com/office/powerpoint/2010/main" val="2660351044"/>
+        <p14:creationId xmlns:p14="http://schemas.microsoft.com/office/powerpoint/2010/main" val="1924561969"/>
       </p:ext>
     </p:extLst>
   </p:cSld>
@@ -11838,7 +11899,7 @@
         </p:nvCxnSpPr>
         <p:spPr>
           <a:xfrm flipV="1">
-            <a:off x="4248244" y="2286004"/>
+            <a:off x="4248244" y="2286010"/>
             <a:ext cx="3024000" cy="449"/>
           </a:xfrm>
           <a:prstGeom prst="straightConnector1">
@@ -11949,7 +12010,7 @@
         </p:nvCxnSpPr>
         <p:spPr>
           <a:xfrm>
-            <a:off x="2718244" y="2646453"/>
+            <a:off x="2718244" y="2646459"/>
             <a:ext cx="1080000" cy="719551"/>
           </a:xfrm>
           <a:prstGeom prst="straightConnector1">
@@ -12165,7 +12226,7 @@
         </p:nvCxnSpPr>
         <p:spPr>
           <a:xfrm flipH="1" flipV="1">
-            <a:off x="4248244" y="2286453"/>
+            <a:off x="4248244" y="2286459"/>
             <a:ext cx="1944000" cy="1529551"/>
           </a:xfrm>
           <a:prstGeom prst="straightConnector1">
@@ -12202,7 +12263,7 @@
         </p:nvSpPr>
         <p:spPr>
           <a:xfrm>
-            <a:off x="6379680" y="2847723"/>
+            <a:off x="6379680" y="2847727"/>
             <a:ext cx="1370888" cy="317459"/>
           </a:xfrm>
           <a:prstGeom prst="rect">
@@ -12232,7 +12293,7 @@
         </p:nvSpPr>
         <p:spPr>
           <a:xfrm>
-            <a:off x="5016850" y="1944377"/>
+            <a:off x="5016850" y="1944381"/>
             <a:ext cx="1370888" cy="317459"/>
           </a:xfrm>
           <a:prstGeom prst="rect">
@@ -12257,7 +12318,7 @@
     </p:spTree>
     <p:extLst>
       <p:ext uri="{BB962C8B-B14F-4D97-AF65-F5344CB8AC3E}">
-        <p14:creationId xmlns:p14="http://schemas.microsoft.com/office/powerpoint/2010/main" val="152779686"/>
+        <p14:creationId xmlns:p14="http://schemas.microsoft.com/office/powerpoint/2010/main" val="2231113612"/>
       </p:ext>
     </p:extLst>
   </p:cSld>
@@ -12411,7 +12472,7 @@
         </p:nvCxnSpPr>
         <p:spPr>
           <a:xfrm flipV="1">
-            <a:off x="4248244" y="2286004"/>
+            <a:off x="4248244" y="2286010"/>
             <a:ext cx="3024000" cy="449"/>
           </a:xfrm>
           <a:prstGeom prst="straightConnector1">
@@ -12522,7 +12583,7 @@
         </p:nvCxnSpPr>
         <p:spPr>
           <a:xfrm>
-            <a:off x="2718244" y="2646453"/>
+            <a:off x="2718244" y="2646459"/>
             <a:ext cx="1080000" cy="719551"/>
           </a:xfrm>
           <a:prstGeom prst="straightConnector1">
@@ -12738,7 +12799,7 @@
         </p:nvCxnSpPr>
         <p:spPr>
           <a:xfrm flipH="1" flipV="1">
-            <a:off x="4248244" y="2286453"/>
+            <a:off x="4248244" y="2286459"/>
             <a:ext cx="1944000" cy="1529551"/>
           </a:xfrm>
           <a:prstGeom prst="straightConnector1">
@@ -12775,7 +12836,7 @@
         </p:nvSpPr>
         <p:spPr>
           <a:xfrm>
-            <a:off x="5064143" y="1944377"/>
+            <a:off x="5064147" y="1944381"/>
             <a:ext cx="1276311" cy="317459"/>
           </a:xfrm>
           <a:prstGeom prst="rect">
@@ -12921,7 +12982,7 @@
         </p:nvSpPr>
         <p:spPr>
           <a:xfrm>
-            <a:off x="6379680" y="2847723"/>
+            <a:off x="6379680" y="2847727"/>
             <a:ext cx="1370888" cy="317459"/>
           </a:xfrm>
           <a:prstGeom prst="rect">
@@ -12955,7 +13016,7 @@
         </p:nvCxnSpPr>
         <p:spPr>
           <a:xfrm flipH="1" flipV="1">
-            <a:off x="1638244" y="1206414"/>
+            <a:off x="1638244" y="1206418"/>
             <a:ext cx="1080000" cy="720035"/>
           </a:xfrm>
           <a:prstGeom prst="straightConnector1">
@@ -13078,7 +13139,7 @@
         </p:nvCxnSpPr>
         <p:spPr>
           <a:xfrm flipH="1">
-            <a:off x="2718244" y="1206000"/>
+            <a:off x="2718244" y="1206004"/>
             <a:ext cx="7074000" cy="720449"/>
           </a:xfrm>
           <a:prstGeom prst="straightConnector1">
@@ -13151,7 +13212,7 @@
     </p:spTree>
     <p:extLst>
       <p:ext uri="{BB962C8B-B14F-4D97-AF65-F5344CB8AC3E}">
-        <p14:creationId xmlns:p14="http://schemas.microsoft.com/office/powerpoint/2010/main" val="3538407241"/>
+        <p14:creationId xmlns:p14="http://schemas.microsoft.com/office/powerpoint/2010/main" val="3249383352"/>
       </p:ext>
     </p:extLst>
   </p:cSld>
@@ -13305,7 +13366,7 @@
         </p:nvCxnSpPr>
         <p:spPr>
           <a:xfrm flipV="1">
-            <a:off x="4248244" y="2286004"/>
+            <a:off x="4248244" y="2286010"/>
             <a:ext cx="3024000" cy="449"/>
           </a:xfrm>
           <a:prstGeom prst="straightConnector1">
@@ -13416,7 +13477,7 @@
         </p:nvCxnSpPr>
         <p:spPr>
           <a:xfrm>
-            <a:off x="2718244" y="2646453"/>
+            <a:off x="2718244" y="2646459"/>
             <a:ext cx="1080000" cy="719551"/>
           </a:xfrm>
           <a:prstGeom prst="straightConnector1">
@@ -13632,7 +13693,7 @@
         </p:nvCxnSpPr>
         <p:spPr>
           <a:xfrm flipH="1" flipV="1">
-            <a:off x="4248244" y="2286453"/>
+            <a:off x="4248244" y="2286459"/>
             <a:ext cx="1944000" cy="1529551"/>
           </a:xfrm>
           <a:prstGeom prst="straightConnector1">
@@ -13669,7 +13730,7 @@
         </p:nvSpPr>
         <p:spPr>
           <a:xfrm>
-            <a:off x="5016850" y="1944377"/>
+            <a:off x="5016850" y="1944381"/>
             <a:ext cx="1370888" cy="317459"/>
           </a:xfrm>
           <a:prstGeom prst="rect">
@@ -14057,7 +14118,7 @@
         </p:nvCxnSpPr>
         <p:spPr>
           <a:xfrm flipH="1" flipV="1">
-            <a:off x="8802244" y="2646004"/>
+            <a:off x="8802244" y="2646010"/>
             <a:ext cx="1745756" cy="2358071"/>
           </a:xfrm>
           <a:prstGeom prst="straightConnector1">
@@ -14104,7 +14165,7 @@
         </p:nvCxnSpPr>
         <p:spPr>
           <a:xfrm flipH="1" flipV="1">
-            <a:off x="7722244" y="4266004"/>
+            <a:off x="7722244" y="4266010"/>
             <a:ext cx="917756" cy="738071"/>
           </a:xfrm>
           <a:prstGeom prst="straightConnector1">
@@ -14257,7 +14318,7 @@
         </p:nvSpPr>
         <p:spPr>
           <a:xfrm>
-            <a:off x="8646854" y="1233996"/>
+            <a:off x="8646860" y="1233996"/>
             <a:ext cx="2514805" cy="3773010"/>
           </a:xfrm>
           <a:custGeom>
@@ -14352,7 +14413,7 @@
         </p:nvCxnSpPr>
         <p:spPr>
           <a:xfrm flipV="1">
-            <a:off x="6732000" y="4266004"/>
+            <a:off x="6732000" y="4266010"/>
             <a:ext cx="990244" cy="738071"/>
           </a:xfrm>
           <a:prstGeom prst="straightConnector1">
@@ -14389,7 +14450,7 @@
         </p:nvSpPr>
         <p:spPr>
           <a:xfrm>
-            <a:off x="6729278" y="1233996"/>
+            <a:off x="6729284" y="1233996"/>
             <a:ext cx="4734199" cy="3773010"/>
           </a:xfrm>
           <a:custGeom>
@@ -14474,7 +14535,7 @@
         </p:nvSpPr>
         <p:spPr>
           <a:xfrm>
-            <a:off x="6379679" y="2847723"/>
+            <a:off x="6379679" y="2847727"/>
             <a:ext cx="1370888" cy="317459"/>
           </a:xfrm>
           <a:prstGeom prst="rect">
@@ -14601,7 +14662,7 @@
         </p:nvCxnSpPr>
         <p:spPr>
           <a:xfrm flipH="1" flipV="1">
-            <a:off x="1638244" y="1206414"/>
+            <a:off x="1638244" y="1206418"/>
             <a:ext cx="1080000" cy="720035"/>
           </a:xfrm>
           <a:prstGeom prst="straightConnector1">
@@ -14910,7 +14971,7 @@
         </p:nvCxnSpPr>
         <p:spPr>
           <a:xfrm flipV="1">
-            <a:off x="4248244" y="2286004"/>
+            <a:off x="4248244" y="2286010"/>
             <a:ext cx="3024000" cy="449"/>
           </a:xfrm>
           <a:prstGeom prst="straightConnector1">
@@ -15021,7 +15082,7 @@
         </p:nvCxnSpPr>
         <p:spPr>
           <a:xfrm>
-            <a:off x="2718244" y="2646453"/>
+            <a:off x="2718244" y="2646459"/>
             <a:ext cx="1080000" cy="719551"/>
           </a:xfrm>
           <a:prstGeom prst="straightConnector1">
@@ -15237,7 +15298,7 @@
         </p:nvCxnSpPr>
         <p:spPr>
           <a:xfrm flipH="1" flipV="1">
-            <a:off x="4248244" y="2286453"/>
+            <a:off x="4248244" y="2286459"/>
             <a:ext cx="1944000" cy="1529551"/>
           </a:xfrm>
           <a:prstGeom prst="straightConnector1">
@@ -15274,7 +15335,7 @@
         </p:nvSpPr>
         <p:spPr>
           <a:xfrm>
-            <a:off x="5016851" y="1944377"/>
+            <a:off x="5016851" y="1944381"/>
             <a:ext cx="1370888" cy="317459"/>
           </a:xfrm>
           <a:prstGeom prst="rect">
@@ -15453,7 +15514,7 @@
         </p:nvCxnSpPr>
         <p:spPr>
           <a:xfrm flipV="1">
-            <a:off x="4248244" y="2286004"/>
+            <a:off x="4248244" y="2286010"/>
             <a:ext cx="3024000" cy="449"/>
           </a:xfrm>
           <a:prstGeom prst="straightConnector1">
@@ -15564,7 +15625,7 @@
         </p:nvCxnSpPr>
         <p:spPr>
           <a:xfrm>
-            <a:off x="2718244" y="2646453"/>
+            <a:off x="2718244" y="2646459"/>
             <a:ext cx="1080000" cy="719551"/>
           </a:xfrm>
           <a:prstGeom prst="straightConnector1">
@@ -15780,7 +15841,7 @@
         </p:nvCxnSpPr>
         <p:spPr>
           <a:xfrm flipH="1" flipV="1">
-            <a:off x="4248244" y="2286453"/>
+            <a:off x="4248244" y="2286459"/>
             <a:ext cx="1944000" cy="1529551"/>
           </a:xfrm>
           <a:prstGeom prst="straightConnector1">
@@ -15817,7 +15878,7 @@
         </p:nvSpPr>
         <p:spPr>
           <a:xfrm>
-            <a:off x="5016851" y="1944377"/>
+            <a:off x="5016851" y="1944381"/>
             <a:ext cx="1370888" cy="317459"/>
           </a:xfrm>
           <a:prstGeom prst="rect">
@@ -15967,7 +16028,7 @@
         </p:nvCxnSpPr>
         <p:spPr>
           <a:xfrm flipH="1" flipV="1">
-            <a:off x="1638244" y="1206414"/>
+            <a:off x="1638244" y="1206418"/>
             <a:ext cx="1080000" cy="720035"/>
           </a:xfrm>
           <a:prstGeom prst="straightConnector1">
@@ -16090,7 +16151,7 @@
         </p:nvCxnSpPr>
         <p:spPr>
           <a:xfrm flipH="1">
-            <a:off x="2718244" y="1206000"/>
+            <a:off x="2718244" y="1206004"/>
             <a:ext cx="7074000" cy="720449"/>
           </a:xfrm>
           <a:prstGeom prst="straightConnector1">

</xml_diff>